<commit_message>
Presentation Real Final. Completed.
</commit_message>
<xml_diff>
--- a/docs/Presentation_Final.pptx
+++ b/docs/Presentation_Final.pptx
@@ -718,7 +718,74 @@
             </a:r>
             <a:r>
               <a:rPr lang="en-US" baseline="0" dirty="0" smtClean="0"/>
-              <a:t> Platform, for a month.</a:t>
+              <a:t> Platform, for a month</a:t>
+            </a:r>
+            <a:r>
+              <a:rPr lang="en-US" baseline="0" dirty="0" smtClean="0"/>
+              <a:t>.</a:t>
+            </a:r>
+          </a:p>
+          <a:p>
+            <a:endParaRPr lang="en-US" baseline="0" dirty="0" smtClean="0"/>
+          </a:p>
+          <a:p>
+            <a:r>
+              <a:rPr lang="ko-KR" altLang="en-US" dirty="0" smtClean="0"/>
+              <a:t>안녕하세요</a:t>
+            </a:r>
+            <a:r>
+              <a:rPr lang="en-US" altLang="ko-KR" dirty="0" smtClean="0"/>
+              <a:t>,</a:t>
+            </a:r>
+            <a:r>
+              <a:rPr lang="ko-KR" altLang="en-US" dirty="0" smtClean="0"/>
+              <a:t> 저는 발표자 홍경환입니다</a:t>
+            </a:r>
+            <a:r>
+              <a:rPr lang="en-US" altLang="ko-KR" dirty="0" smtClean="0"/>
+              <a:t>.</a:t>
+            </a:r>
+          </a:p>
+          <a:p>
+            <a:r>
+              <a:rPr lang="ko-KR" altLang="en-US" dirty="0" smtClean="0"/>
+              <a:t>우리는</a:t>
+            </a:r>
+            <a:r>
+              <a:rPr lang="en-US" altLang="ko-KR" dirty="0" smtClean="0"/>
+              <a:t> </a:t>
+            </a:r>
+            <a:r>
+              <a:rPr lang="ko-KR" altLang="en-US" dirty="0" smtClean="0"/>
+              <a:t>한 달 동안 </a:t>
+            </a:r>
+            <a:r>
+              <a:rPr lang="en-US" altLang="ko-KR" dirty="0" err="1" smtClean="0"/>
+              <a:t>OpenSSD</a:t>
+            </a:r>
+            <a:r>
+              <a:rPr lang="en-US" altLang="ko-KR" dirty="0" smtClean="0"/>
+              <a:t> </a:t>
+            </a:r>
+            <a:r>
+              <a:rPr lang="ko-KR" altLang="en-US" dirty="0" smtClean="0"/>
+              <a:t>플랫폼을 기반으로 </a:t>
+            </a:r>
+            <a:r>
+              <a:rPr lang="en-US" altLang="ko-KR" dirty="0" smtClean="0"/>
+              <a:t>Sector</a:t>
+            </a:r>
+            <a:r>
+              <a:rPr lang="en-US" altLang="ko-KR" baseline="0" dirty="0" smtClean="0"/>
+              <a:t> Level Mapping FTL</a:t>
+            </a:r>
+            <a:r>
+              <a:rPr lang="ko-KR" altLang="en-US" baseline="0" dirty="0" smtClean="0"/>
+              <a:t>을 만드는 프로젝트를 진행했습니다</a:t>
+            </a:r>
+            <a:r>
+              <a:rPr lang="en-US" altLang="ko-KR" baseline="0" dirty="0" smtClean="0"/>
+              <a:t>.</a:t>
             </a:r>
             <a:endParaRPr lang="en-US" dirty="0"/>
           </a:p>
@@ -971,7 +1038,27 @@
             </a:r>
             <a:r>
               <a:rPr lang="en-US" baseline="0" dirty="0" smtClean="0"/>
-              <a:t> is sector level mapping FTLs, but tutorial 1, greedy is page level mapping FTLs.</a:t>
+              <a:t> </a:t>
+            </a:r>
+            <a:r>
+              <a:rPr lang="en-US" baseline="0" dirty="0" smtClean="0"/>
+              <a:t>are</a:t>
+            </a:r>
+            <a:r>
+              <a:rPr lang="en-US" baseline="0" dirty="0" smtClean="0"/>
+              <a:t> </a:t>
+            </a:r>
+            <a:r>
+              <a:rPr lang="en-US" baseline="0" dirty="0" smtClean="0"/>
+              <a:t>sector level mapping FTLs, but tutorial 1, greedy </a:t>
+            </a:r>
+            <a:r>
+              <a:rPr lang="en-US" baseline="0" dirty="0" smtClean="0"/>
+              <a:t>are </a:t>
+            </a:r>
+            <a:r>
+              <a:rPr lang="en-US" baseline="0" dirty="0" smtClean="0"/>
+              <a:t>page level mapping FTLs.</a:t>
             </a:r>
             <a:endParaRPr lang="en-US" altLang="ko-KR" baseline="0" dirty="0" smtClean="0"/>
           </a:p>
@@ -982,7 +1069,15 @@
             </a:r>
             <a:r>
               <a:rPr lang="en-US" baseline="0" dirty="0" smtClean="0"/>
-              <a:t> mapping FTLs has greater random write IOPS than page mapping FTLs.</a:t>
+              <a:t> mapping FTLs </a:t>
+            </a:r>
+            <a:r>
+              <a:rPr lang="en-US" baseline="0" dirty="0" smtClean="0"/>
+              <a:t>have </a:t>
+            </a:r>
+            <a:r>
+              <a:rPr lang="en-US" baseline="0" dirty="0" smtClean="0"/>
+              <a:t>greater random write IOPS than page mapping FTLs.</a:t>
             </a:r>
           </a:p>
           <a:p>
@@ -1102,7 +1197,15 @@
             </a:r>
             <a:r>
               <a:rPr lang="en-US" baseline="0" dirty="0" smtClean="0"/>
-              <a:t> has worse sequential performance than page mapping FTLs.</a:t>
+              <a:t> </a:t>
+            </a:r>
+            <a:r>
+              <a:rPr lang="en-US" baseline="0" dirty="0" smtClean="0"/>
+              <a:t>have </a:t>
+            </a:r>
+            <a:r>
+              <a:rPr lang="en-US" baseline="0" dirty="0" smtClean="0"/>
+              <a:t>worse sequential performance than page mapping FTLs.</a:t>
             </a:r>
           </a:p>
           <a:p>
@@ -1128,8 +1231,8 @@
               <a:t> dynamic and static </a:t>
             </a:r>
             <a:r>
-              <a:rPr lang="en-US" baseline="0" smtClean="0"/>
-              <a:t>FTLs can )</a:t>
+              <a:rPr lang="en-US" baseline="0" dirty="0" smtClean="0"/>
+              <a:t>FTL have grater read performance than 1-buffer and multi-copy FTL. It is because dynamic and static FTL distribute pages by bank, but 1-buffer and multi-copy dose not.)</a:t>
             </a:r>
             <a:endParaRPr lang="en-US" dirty="0"/>
           </a:p>
@@ -1273,8 +1376,43 @@
             </a:r>
             <a:r>
               <a:rPr lang="en-US" baseline="0" dirty="0" smtClean="0"/>
-              <a:t> level FTLs has greater random write performance than page level FTLs.</a:t>
-            </a:r>
+              <a:t> level FTLs has greater random write performance than page level FTLs</a:t>
+            </a:r>
+            <a:r>
+              <a:rPr lang="en-US" baseline="0" dirty="0" smtClean="0"/>
+              <a:t>.</a:t>
+            </a:r>
+          </a:p>
+          <a:p>
+            <a:endParaRPr lang="en-US" baseline="0" dirty="0" smtClean="0"/>
+          </a:p>
+          <a:p>
+            <a:pPr marL="0" marR="0" indent="0" algn="l" defTabSz="914400" rtl="0" eaLnBrk="1" fontAlgn="auto" latinLnBrk="1" hangingPunct="1">
+              <a:lnSpc>
+                <a:spcPct val="100000"/>
+              </a:lnSpc>
+              <a:spcBef>
+                <a:spcPts val="0"/>
+              </a:spcBef>
+              <a:spcAft>
+                <a:spcPts val="0"/>
+              </a:spcAft>
+              <a:buClrTx/>
+              <a:buSzTx/>
+              <a:buFontTx/>
+              <a:buNone/>
+              <a:tabLst/>
+              <a:defRPr/>
+            </a:pPr>
+            <a:r>
+              <a:rPr lang="en-US" dirty="0" smtClean="0"/>
+              <a:t>It is because in</a:t>
+            </a:r>
+            <a:r>
+              <a:rPr lang="en-US" baseline="0" dirty="0" smtClean="0"/>
+              <a:t> small random write, page mapping FTLs waste more spaces than sector mapping FTLs.</a:t>
+            </a:r>
+            <a:endParaRPr lang="en-US" baseline="0" dirty="0" smtClean="0"/>
           </a:p>
           <a:p>
             <a:endParaRPr lang="en-US" baseline="0" dirty="0" smtClean="0"/>
@@ -1372,89 +1510,24 @@
           <a:p>
             <a:r>
               <a:rPr lang="en-US" baseline="0" dirty="0" smtClean="0"/>
-              <a:t>In random write test, these are IOPS of each FTLs.</a:t>
+              <a:t>Prior experiment was the test without map table caching.</a:t>
             </a:r>
           </a:p>
           <a:p>
             <a:r>
               <a:rPr lang="en-US" baseline="0" dirty="0" smtClean="0"/>
-              <a:t>1_buffer, dynamic, static, </a:t>
-            </a:r>
-            <a:r>
-              <a:rPr lang="en-US" baseline="0" dirty="0" err="1" smtClean="0"/>
-              <a:t>multi_copy</a:t>
+              <a:t>B</a:t>
             </a:r>
             <a:r>
               <a:rPr lang="en-US" baseline="0" dirty="0" smtClean="0"/>
-              <a:t> is sector level mapping FTLs, but tutorial 1, greedy is page level mapping FTLs.</a:t>
-            </a:r>
-          </a:p>
-          <a:p>
-            <a:pPr marL="0" marR="0" indent="0" algn="l" defTabSz="914400" rtl="0" eaLnBrk="1" fontAlgn="auto" latinLnBrk="1" hangingPunct="1">
-              <a:lnSpc>
-                <a:spcPct val="100000"/>
-              </a:lnSpc>
-              <a:spcBef>
-                <a:spcPts val="0"/>
-              </a:spcBef>
-              <a:spcAft>
-                <a:spcPts val="0"/>
-              </a:spcAft>
-              <a:buClrTx/>
-              <a:buSzTx/>
-              <a:buFontTx/>
-              <a:buNone/>
-              <a:tabLst/>
-              <a:defRPr/>
-            </a:pPr>
+              <a:t>ut in test with map table caching, miss rate becomes about 90%, so the map table caching overhead increase total overhead so much.</a:t>
+            </a:r>
+          </a:p>
+          <a:p>
             <a:r>
               <a:rPr lang="en-US" baseline="0" dirty="0" smtClean="0"/>
-              <a:t>In 512Bytes, four sector level FTLs shown about 20000 IOPS, but two page level FTLs shown about only 2400, 1600 IOPS.</a:t>
-            </a:r>
-          </a:p>
-          <a:p>
-            <a:pPr marL="0" marR="0" indent="0" algn="l" defTabSz="914400" rtl="0" eaLnBrk="1" fontAlgn="auto" latinLnBrk="1" hangingPunct="1">
-              <a:lnSpc>
-                <a:spcPct val="100000"/>
-              </a:lnSpc>
-              <a:spcBef>
-                <a:spcPts val="0"/>
-              </a:spcBef>
-              <a:spcAft>
-                <a:spcPts val="0"/>
-              </a:spcAft>
-              <a:buClrTx/>
-              <a:buSzTx/>
-              <a:buFontTx/>
-              <a:buNone/>
-              <a:tabLst/>
-              <a:defRPr/>
-            </a:pPr>
-            <a:r>
-              <a:rPr lang="en-US" baseline="0" dirty="0" smtClean="0"/>
-              <a:t>It is 10 times difference.</a:t>
-            </a:r>
-          </a:p>
-          <a:p>
-            <a:r>
-              <a:rPr lang="en-US" dirty="0" smtClean="0"/>
-              <a:t>Sector</a:t>
-            </a:r>
-            <a:r>
-              <a:rPr lang="en-US" baseline="0" dirty="0" smtClean="0"/>
-              <a:t> level FTLs has greater random write performance than page level FTLs.</a:t>
-            </a:r>
-          </a:p>
-          <a:p>
-            <a:endParaRPr lang="en-US" baseline="0" dirty="0" smtClean="0"/>
-          </a:p>
-          <a:p>
-            <a:r>
-              <a:rPr lang="en-US" baseline="0" dirty="0" smtClean="0"/>
-              <a:t>In sequential test, write speed and read speed of sector level FTLs are about 8 times slower than page level FTLs.</a:t>
-            </a:r>
-          </a:p>
-          <a:p>
+              <a:t>Therefore, the performance decreases about 1 over 50 times!</a:t>
+            </a:r>
             <a:endParaRPr lang="en-US" baseline="0" dirty="0" smtClean="0"/>
           </a:p>
         </p:txBody>
@@ -1866,7 +1939,58 @@
           <a:p>
             <a:r>
               <a:rPr lang="en-US" baseline="0" dirty="0" smtClean="0"/>
-              <a:t>Then I will talk about experiments, and conclusion.</a:t>
+              <a:t>Then I will talk about experiments, and conclusion</a:t>
+            </a:r>
+            <a:r>
+              <a:rPr lang="en-US" baseline="0" dirty="0" smtClean="0"/>
+              <a:t>.</a:t>
+            </a:r>
+          </a:p>
+          <a:p>
+            <a:endParaRPr lang="en-US" baseline="0" dirty="0" smtClean="0"/>
+          </a:p>
+          <a:p>
+            <a:r>
+              <a:rPr lang="en-US" dirty="0" smtClean="0"/>
+              <a:t>Sector Level</a:t>
+            </a:r>
+            <a:r>
+              <a:rPr lang="en-US" baseline="0" dirty="0" smtClean="0"/>
+              <a:t> Mapping</a:t>
+            </a:r>
+            <a:r>
+              <a:rPr lang="ko-KR" altLang="en-US" baseline="0" dirty="0" smtClean="0"/>
+              <a:t>과 이에 대한 고찰에 대해 먼저 말씀드리겠습니다</a:t>
+            </a:r>
+            <a:r>
+              <a:rPr lang="en-US" altLang="ko-KR" baseline="0" dirty="0" smtClean="0"/>
+              <a:t>.</a:t>
+            </a:r>
+          </a:p>
+          <a:p>
+            <a:r>
+              <a:rPr lang="ko-KR" altLang="en-US" baseline="0" dirty="0" smtClean="0"/>
+              <a:t>그 후 </a:t>
+            </a:r>
+            <a:r>
+              <a:rPr lang="en-US" altLang="ko-KR" baseline="0" dirty="0" smtClean="0"/>
+              <a:t>Sector Level Mapping</a:t>
+            </a:r>
+            <a:r>
+              <a:rPr lang="ko-KR" altLang="en-US" baseline="0" dirty="0" smtClean="0"/>
+              <a:t>에 필요한 </a:t>
+            </a:r>
+            <a:r>
+              <a:rPr lang="en-US" altLang="ko-KR" baseline="0" dirty="0" smtClean="0"/>
+              <a:t>write module, read module</a:t>
+            </a:r>
+            <a:r>
+              <a:rPr lang="ko-KR" altLang="en-US" baseline="0" dirty="0" smtClean="0"/>
+              <a:t>, 이에 대한 실험과 결론까지 말씀드리겠습니다</a:t>
+            </a:r>
+            <a:r>
+              <a:rPr lang="en-US" altLang="ko-KR" baseline="0" dirty="0" smtClean="0"/>
+              <a:t>.</a:t>
             </a:r>
             <a:endParaRPr lang="en-US" dirty="0"/>
           </a:p>
@@ -1963,7 +2087,15 @@
             </a:r>
             <a:r>
               <a:rPr lang="en-US" altLang="ko-KR" baseline="0" dirty="0" smtClean="0"/>
-              <a:t> made two main data structure for sector level mapping.</a:t>
+              <a:t> made two main data </a:t>
+            </a:r>
+            <a:r>
+              <a:rPr lang="en-US" altLang="ko-KR" baseline="0" dirty="0" smtClean="0"/>
+              <a:t>structures </a:t>
+            </a:r>
+            <a:r>
+              <a:rPr lang="en-US" altLang="ko-KR" baseline="0" dirty="0" smtClean="0"/>
+              <a:t>for sector level mapping.</a:t>
             </a:r>
           </a:p>
           <a:p>
@@ -1987,23 +2119,7 @@
           <a:p>
             <a:r>
               <a:rPr lang="en-US" altLang="ko-KR" baseline="0" dirty="0" smtClean="0"/>
-              <a:t>So when </a:t>
-            </a:r>
-            <a:r>
-              <a:rPr lang="en-US" altLang="ko-KR" baseline="0" dirty="0" smtClean="0"/>
-              <a:t>some requests are </a:t>
-            </a:r>
-            <a:r>
-              <a:rPr lang="en-US" altLang="ko-KR" baseline="0" dirty="0" smtClean="0"/>
-              <a:t>coming to FTL, </a:t>
-            </a:r>
-            <a:r>
-              <a:rPr lang="en-US" altLang="ko-KR" baseline="0" dirty="0" smtClean="0"/>
-              <a:t>LSN </a:t>
-            </a:r>
-            <a:r>
-              <a:rPr lang="en-US" altLang="ko-KR" baseline="0" dirty="0" smtClean="0"/>
-              <a:t>is translated to PSN through Sector Mapping Table. </a:t>
+              <a:t>So when some requests are coming to FTL, LSN is translated to PSN through Sector Mapping Table. </a:t>
             </a:r>
           </a:p>
           <a:p>
@@ -2019,15 +2135,7 @@
             </a:r>
             <a:r>
               <a:rPr lang="en-US" altLang="ko-KR" baseline="0" dirty="0" smtClean="0"/>
-              <a:t> buffer is the buffer </a:t>
-            </a:r>
-            <a:r>
-              <a:rPr lang="en-US" altLang="ko-KR" baseline="0" dirty="0" smtClean="0"/>
-              <a:t>merging incoming </a:t>
-            </a:r>
-            <a:r>
-              <a:rPr lang="en-US" altLang="ko-KR" baseline="0" dirty="0" smtClean="0"/>
-              <a:t>sectors to a page. </a:t>
+              <a:t> buffer is the buffer merging incoming sectors to a page. </a:t>
             </a:r>
           </a:p>
           <a:p>
@@ -2035,7 +2143,6 @@
               <a:rPr lang="en-US" altLang="ko-KR" baseline="0" dirty="0" smtClean="0"/>
               <a:t>It is because the basic writing unit is page, not sector. </a:t>
             </a:r>
-            <a:endParaRPr lang="en-US" altLang="ko-KR" baseline="0" dirty="0" smtClean="0"/>
           </a:p>
           <a:p>
             <a:r>
@@ -2046,9 +2153,337 @@
           <a:p>
             <a:r>
               <a:rPr lang="en-US" altLang="ko-KR" baseline="0" dirty="0" smtClean="0"/>
-              <a:t>And when merge buffer is full, program these data page to NAND.</a:t>
-            </a:r>
-            <a:endParaRPr lang="ko-KR" altLang="en-US" dirty="0"/>
+              <a:t>And when merge buffer is full</a:t>
+            </a:r>
+            <a:r>
+              <a:rPr lang="en-US" altLang="ko-KR" baseline="0" dirty="0" smtClean="0"/>
+              <a:t>, it programs these pages </a:t>
+            </a:r>
+            <a:r>
+              <a:rPr lang="en-US" altLang="ko-KR" baseline="0" dirty="0" smtClean="0"/>
+              <a:t>to NAND</a:t>
+            </a:r>
+            <a:r>
+              <a:rPr lang="en-US" altLang="ko-KR" baseline="0" dirty="0" smtClean="0"/>
+              <a:t>.</a:t>
+            </a:r>
+          </a:p>
+          <a:p>
+            <a:endParaRPr lang="en-US" altLang="ko-KR" baseline="0" dirty="0" smtClean="0"/>
+          </a:p>
+          <a:p>
+            <a:r>
+              <a:rPr lang="ko-KR" altLang="en-US" dirty="0" smtClean="0"/>
+              <a:t>우리는 </a:t>
+            </a:r>
+            <a:r>
+              <a:rPr lang="en-US" altLang="ko-KR" dirty="0" smtClean="0"/>
+              <a:t>sector level mapping</a:t>
+            </a:r>
+            <a:r>
+              <a:rPr lang="ko-KR" altLang="en-US" dirty="0" smtClean="0"/>
+              <a:t>을 위해 두 가지 주요 자료 구조들을 구현했습니다</a:t>
+            </a:r>
+            <a:r>
+              <a:rPr lang="en-US" altLang="ko-KR" dirty="0" smtClean="0"/>
+              <a:t>.</a:t>
+            </a:r>
+          </a:p>
+          <a:p>
+            <a:r>
+              <a:rPr lang="ko-KR" altLang="en-US" dirty="0" smtClean="0"/>
+              <a:t>하나는 </a:t>
+            </a:r>
+            <a:r>
+              <a:rPr lang="en-US" altLang="ko-KR" dirty="0" smtClean="0"/>
+              <a:t>sector</a:t>
+            </a:r>
+            <a:r>
+              <a:rPr lang="en-US" altLang="ko-KR" baseline="0" dirty="0" smtClean="0"/>
+              <a:t> mapping</a:t>
+            </a:r>
+            <a:r>
+              <a:rPr lang="ko-KR" altLang="en-US" baseline="0" dirty="0" smtClean="0"/>
+              <a:t> </a:t>
+            </a:r>
+            <a:r>
+              <a:rPr lang="en-US" altLang="ko-KR" baseline="0" dirty="0" smtClean="0"/>
+              <a:t>table</a:t>
+            </a:r>
+            <a:r>
+              <a:rPr lang="ko-KR" altLang="en-US" baseline="0" dirty="0" smtClean="0"/>
+              <a:t>이며</a:t>
+            </a:r>
+            <a:r>
+              <a:rPr lang="en-US" altLang="ko-KR" baseline="0" dirty="0" smtClean="0"/>
+              <a:t>,</a:t>
+            </a:r>
+            <a:r>
+              <a:rPr lang="ko-KR" altLang="en-US" baseline="0" dirty="0" smtClean="0"/>
+              <a:t> 또 다른 하나는 </a:t>
+            </a:r>
+            <a:r>
+              <a:rPr lang="en-US" altLang="ko-KR" baseline="0" dirty="0" smtClean="0"/>
+              <a:t>merge buffer</a:t>
+            </a:r>
+            <a:r>
+              <a:rPr lang="ko-KR" altLang="en-US" baseline="0" dirty="0" smtClean="0"/>
+              <a:t>입니다</a:t>
+            </a:r>
+            <a:r>
+              <a:rPr lang="en-US" altLang="ko-KR" baseline="0" dirty="0" smtClean="0"/>
+              <a:t>.</a:t>
+            </a:r>
+          </a:p>
+          <a:p>
+            <a:r>
+              <a:rPr lang="en-US" altLang="ko-KR" dirty="0" smtClean="0"/>
+              <a:t>Sector mapping table</a:t>
+            </a:r>
+            <a:r>
+              <a:rPr lang="ko-KR" altLang="en-US" dirty="0" smtClean="0"/>
+              <a:t>은 </a:t>
+            </a:r>
+            <a:r>
+              <a:rPr lang="en-US" altLang="ko-KR" dirty="0" smtClean="0"/>
+              <a:t>physical sector number, PSN</a:t>
+            </a:r>
+            <a:r>
+              <a:rPr lang="ko-KR" altLang="en-US" dirty="0" smtClean="0"/>
+              <a:t>들로 이루어진 배열을 말합니다</a:t>
+            </a:r>
+            <a:r>
+              <a:rPr lang="en-US" altLang="ko-KR" dirty="0" smtClean="0"/>
+              <a:t>.</a:t>
+            </a:r>
+            <a:r>
+              <a:rPr lang="ko-KR" altLang="en-US" dirty="0"/>
+              <a:t> </a:t>
+            </a:r>
+            <a:r>
+              <a:rPr lang="ko-KR" altLang="en-US" dirty="0" smtClean="0"/>
+              <a:t>또한 </a:t>
+            </a:r>
+            <a:r>
+              <a:rPr lang="en-US" altLang="ko-KR" dirty="0" smtClean="0"/>
+              <a:t>LSN</a:t>
+            </a:r>
+            <a:r>
+              <a:rPr lang="ko-KR" altLang="en-US" dirty="0" smtClean="0"/>
+              <a:t>이 이 배열의 </a:t>
+            </a:r>
+            <a:r>
+              <a:rPr lang="en-US" altLang="ko-KR" dirty="0" smtClean="0"/>
+              <a:t>index</a:t>
+            </a:r>
+            <a:r>
+              <a:rPr lang="ko-KR" altLang="en-US" dirty="0" smtClean="0"/>
+              <a:t>입니다</a:t>
+            </a:r>
+            <a:r>
+              <a:rPr lang="en-US" altLang="ko-KR" dirty="0" smtClean="0"/>
+              <a:t>.</a:t>
+            </a:r>
+          </a:p>
+          <a:p>
+            <a:r>
+              <a:rPr lang="en-US" altLang="ko-KR" dirty="0" smtClean="0"/>
+              <a:t>FTL</a:t>
+            </a:r>
+            <a:r>
+              <a:rPr lang="ko-KR" altLang="en-US" dirty="0" smtClean="0"/>
+              <a:t>로 어떤 </a:t>
+            </a:r>
+            <a:r>
+              <a:rPr lang="en-US" altLang="ko-KR" dirty="0" smtClean="0"/>
+              <a:t>request</a:t>
+            </a:r>
+            <a:r>
+              <a:rPr lang="ko-KR" altLang="en-US" dirty="0" smtClean="0"/>
+              <a:t>가 오면</a:t>
+            </a:r>
+            <a:r>
+              <a:rPr lang="en-US" altLang="ko-KR" dirty="0" smtClean="0"/>
+              <a:t>,</a:t>
+            </a:r>
+            <a:r>
+              <a:rPr lang="ko-KR" altLang="en-US" dirty="0" smtClean="0"/>
+              <a:t> </a:t>
+            </a:r>
+            <a:r>
+              <a:rPr lang="en-US" altLang="ko-KR" dirty="0" smtClean="0"/>
+              <a:t>LSN</a:t>
+            </a:r>
+            <a:r>
+              <a:rPr lang="ko-KR" altLang="en-US" dirty="0" smtClean="0"/>
+              <a:t>이 </a:t>
+            </a:r>
+            <a:r>
+              <a:rPr lang="en-US" altLang="ko-KR" dirty="0" smtClean="0"/>
+              <a:t>sector</a:t>
+            </a:r>
+            <a:r>
+              <a:rPr lang="en-US" altLang="ko-KR" baseline="0" dirty="0" smtClean="0"/>
+              <a:t> mapping table</a:t>
+            </a:r>
+            <a:r>
+              <a:rPr lang="ko-KR" altLang="en-US" baseline="0" dirty="0" smtClean="0"/>
+              <a:t>을 통해 </a:t>
+            </a:r>
+            <a:r>
+              <a:rPr lang="en-US" altLang="ko-KR" baseline="0" dirty="0" smtClean="0"/>
+              <a:t>PSN</a:t>
+            </a:r>
+            <a:r>
+              <a:rPr lang="ko-KR" altLang="en-US" baseline="0" dirty="0" smtClean="0"/>
+              <a:t>으로 번역됩니다</a:t>
+            </a:r>
+            <a:r>
+              <a:rPr lang="en-US" altLang="ko-KR" baseline="0" dirty="0" smtClean="0"/>
+              <a:t>.</a:t>
+            </a:r>
+          </a:p>
+          <a:p>
+            <a:r>
+              <a:rPr lang="ko-KR" altLang="en-US" baseline="0" dirty="0" smtClean="0"/>
+              <a:t>이 </a:t>
+            </a:r>
+            <a:r>
+              <a:rPr lang="en-US" altLang="ko-KR" baseline="0" dirty="0" smtClean="0"/>
+              <a:t>PSN</a:t>
+            </a:r>
+            <a:r>
+              <a:rPr lang="ko-KR" altLang="en-US" baseline="0" dirty="0" smtClean="0"/>
+              <a:t>은 나중에 </a:t>
+            </a:r>
+            <a:r>
+              <a:rPr lang="en-US" altLang="ko-KR" baseline="0" dirty="0" smtClean="0"/>
+              <a:t>NAND</a:t>
+            </a:r>
+            <a:r>
+              <a:rPr lang="ko-KR" altLang="en-US" baseline="0" dirty="0" smtClean="0"/>
+              <a:t>를 물리적으로 접근하기 위해 사용됩니다</a:t>
+            </a:r>
+            <a:r>
+              <a:rPr lang="en-US" altLang="ko-KR" baseline="0" dirty="0" smtClean="0"/>
+              <a:t>.</a:t>
+            </a:r>
+          </a:p>
+          <a:p>
+            <a:r>
+              <a:rPr lang="en-US" altLang="ko-KR" baseline="0" dirty="0" smtClean="0"/>
+              <a:t>Merge buffer</a:t>
+            </a:r>
+            <a:r>
+              <a:rPr lang="ko-KR" altLang="en-US" baseline="0" dirty="0" smtClean="0"/>
+              <a:t>는 들어오는 섹터를 한 페이지로 합쳐주는 버퍼입니다</a:t>
+            </a:r>
+            <a:r>
+              <a:rPr lang="en-US" altLang="ko-KR" baseline="0" dirty="0" smtClean="0"/>
+              <a:t>.</a:t>
+            </a:r>
+          </a:p>
+          <a:p>
+            <a:r>
+              <a:rPr lang="en-US" altLang="ko-KR" baseline="0" dirty="0" smtClean="0"/>
+              <a:t>NAND</a:t>
+            </a:r>
+            <a:r>
+              <a:rPr lang="ko-KR" altLang="en-US" baseline="0" dirty="0" smtClean="0"/>
+              <a:t>에 </a:t>
+            </a:r>
+            <a:r>
+              <a:rPr lang="en-US" altLang="ko-KR" baseline="0" dirty="0" smtClean="0"/>
+              <a:t>‘</a:t>
+            </a:r>
+            <a:r>
+              <a:rPr lang="ko-KR" altLang="en-US" baseline="0" dirty="0" smtClean="0"/>
+              <a:t>쓰기</a:t>
+            </a:r>
+            <a:r>
+              <a:rPr lang="en-US" altLang="ko-KR" baseline="0" dirty="0" smtClean="0"/>
+              <a:t>’</a:t>
+            </a:r>
+            <a:r>
+              <a:rPr lang="ko-KR" altLang="en-US" baseline="0" dirty="0" smtClean="0"/>
+              <a:t>를 하는 기본 단위는 섹터가 아니라 페이지이기 때문이죠</a:t>
+            </a:r>
+            <a:r>
+              <a:rPr lang="en-US" altLang="ko-KR" baseline="0" dirty="0" smtClean="0"/>
+              <a:t>.</a:t>
+            </a:r>
+          </a:p>
+          <a:p>
+            <a:r>
+              <a:rPr lang="en-US" altLang="ko-KR" baseline="0" dirty="0" smtClean="0"/>
+              <a:t>FTL</a:t>
+            </a:r>
+            <a:r>
+              <a:rPr lang="ko-KR" altLang="en-US" baseline="0" dirty="0" smtClean="0"/>
+              <a:t>에 쓰기 명령이 들어오면</a:t>
+            </a:r>
+            <a:r>
+              <a:rPr lang="en-US" altLang="ko-KR" baseline="0" dirty="0" smtClean="0"/>
+              <a:t>,</a:t>
+            </a:r>
+            <a:r>
+              <a:rPr lang="ko-KR" altLang="en-US" baseline="0" dirty="0" smtClean="0"/>
+              <a:t> 섹터들은 이 버퍼에 쌓이게 됩니다</a:t>
+            </a:r>
+            <a:r>
+              <a:rPr lang="en-US" altLang="ko-KR" baseline="0" dirty="0" smtClean="0"/>
+              <a:t>.</a:t>
+            </a:r>
+          </a:p>
+          <a:p>
+            <a:r>
+              <a:rPr lang="en-US" altLang="ko-KR" baseline="0" dirty="0" smtClean="0"/>
+              <a:t>Merge buffer</a:t>
+            </a:r>
+            <a:r>
+              <a:rPr lang="ko-KR" altLang="en-US" baseline="0" dirty="0" smtClean="0"/>
+              <a:t>가 가득차면</a:t>
+            </a:r>
+            <a:r>
+              <a:rPr lang="en-US" altLang="ko-KR" baseline="0" dirty="0" smtClean="0"/>
+              <a:t>,</a:t>
+            </a:r>
+            <a:r>
+              <a:rPr lang="ko-KR" altLang="en-US" baseline="0" dirty="0" smtClean="0"/>
+              <a:t> </a:t>
+            </a:r>
+            <a:r>
+              <a:rPr lang="en-US" altLang="ko-KR" baseline="0" dirty="0" smtClean="0"/>
+              <a:t>FTL</a:t>
+            </a:r>
+            <a:r>
+              <a:rPr lang="ko-KR" altLang="en-US" baseline="0" dirty="0" smtClean="0"/>
+              <a:t>은 안에 있는 페이지를 </a:t>
+            </a:r>
+            <a:r>
+              <a:rPr lang="en-US" altLang="ko-KR" baseline="0" dirty="0" smtClean="0"/>
+              <a:t>NAND</a:t>
+            </a:r>
+            <a:r>
+              <a:rPr lang="ko-KR" altLang="en-US" baseline="0" dirty="0" smtClean="0"/>
+              <a:t>로 </a:t>
+            </a:r>
+            <a:r>
+              <a:rPr lang="en-US" altLang="ko-KR" baseline="0" dirty="0" smtClean="0"/>
+              <a:t>program</a:t>
+            </a:r>
+            <a:r>
+              <a:rPr lang="ko-KR" altLang="en-US" baseline="0" dirty="0" smtClean="0"/>
+              <a:t>하게 됩니다</a:t>
+            </a:r>
+            <a:r>
+              <a:rPr lang="ko-KR" altLang="ko-KR" baseline="0" dirty="0" smtClean="0"/>
+              <a:t>.</a:t>
+            </a:r>
+            <a:endParaRPr lang="en-US" altLang="ko-KR" baseline="0" dirty="0" smtClean="0"/>
+          </a:p>
+          <a:p>
+            <a:endParaRPr lang="en-US" altLang="ko-KR" dirty="0" smtClean="0"/>
           </a:p>
         </p:txBody>
       </p:sp>
@@ -2289,8 +2724,38 @@
                 <a:ea typeface="+mn-ea"/>
                 <a:cs typeface="+mn-cs"/>
               </a:rPr>
-              <a:t>If one page in the merge buffer, FTL flushes the page to NAND, and updates PSNs.</a:t>
-            </a:r>
+              <a:t>If one page in the merge buffer, FTL flushes the page to NAND, and updates </a:t>
+            </a:r>
+            <a:r>
+              <a:rPr lang="en-US" altLang="ko-KR" sz="1200" u="none" kern="1200" baseline="0" dirty="0" smtClean="0">
+                <a:solidFill>
+                  <a:schemeClr val="tx1"/>
+                </a:solidFill>
+                <a:latin typeface="+mn-lt"/>
+                <a:ea typeface="+mn-ea"/>
+                <a:cs typeface="+mn-cs"/>
+              </a:rPr>
+              <a:t>PSNs</a:t>
+            </a:r>
+            <a:r>
+              <a:rPr lang="ko-KR" altLang="ko-KR" sz="1200" u="none" kern="1200" baseline="0" dirty="0" smtClean="0">
+                <a:solidFill>
+                  <a:schemeClr val="tx1"/>
+                </a:solidFill>
+                <a:latin typeface="+mn-lt"/>
+                <a:ea typeface="+mn-ea"/>
+                <a:cs typeface="+mn-cs"/>
+              </a:rPr>
+              <a:t>.</a:t>
+            </a:r>
+            <a:endParaRPr lang="en-US" altLang="ko-KR" sz="1200" u="none" kern="1200" baseline="0" dirty="0" smtClean="0">
+              <a:solidFill>
+                <a:schemeClr val="tx1"/>
+              </a:solidFill>
+              <a:latin typeface="+mn-lt"/>
+              <a:ea typeface="+mn-ea"/>
+              <a:cs typeface="+mn-cs"/>
+            </a:endParaRPr>
           </a:p>
         </p:txBody>
       </p:sp>
@@ -6021,6 +6486,36 @@
             <a:r>
               <a:rPr lang="en-US" sz="2400" dirty="0" smtClean="0"/>
               <a:t>x 1/50 ~ 1/20</a:t>
+            </a:r>
+            <a:endParaRPr lang="en-US" sz="2400" dirty="0"/>
+          </a:p>
+        </p:txBody>
+      </p:sp>
+      <p:sp>
+        <p:nvSpPr>
+          <p:cNvPr id="5" name="TextBox 4"/>
+          <p:cNvSpPr txBox="1"/>
+          <p:nvPr/>
+        </p:nvSpPr>
+        <p:spPr>
+          <a:xfrm>
+            <a:off x="971600" y="5415607"/>
+            <a:ext cx="6264696" cy="461665"/>
+          </a:xfrm>
+          <a:prstGeom prst="rect">
+            <a:avLst/>
+          </a:prstGeom>
+          <a:noFill/>
+        </p:spPr>
+        <p:txBody>
+          <a:bodyPr wrap="square" rtlCol="0">
+            <a:spAutoFit/>
+          </a:bodyPr>
+          <a:lstStyle/>
+          <a:p>
+            <a:r>
+              <a:rPr lang="en-US" sz="2400" dirty="0" smtClean="0"/>
+              <a:t>Cache Miss Rate : about 90% (Random Write)</a:t>
             </a:r>
             <a:endParaRPr lang="en-US" sz="2400" dirty="0"/>
           </a:p>

</xml_diff>